<commit_message>
v0.2.6 - highlight microdate
</commit_message>
<xml_diff>
--- a/presentation/wedi_wade.pptx
+++ b/presentation/wedi_wade.pptx
@@ -2072,6 +2072,13 @@
         </dgm:presLayoutVars>
       </dgm:prSet>
       <dgm:spPr/>
+      <dgm:t>
+        <a:bodyPr/>
+        <a:lstStyle/>
+        <a:p>
+          <a:endParaRPr lang="en-US"/>
+        </a:p>
+      </dgm:t>
     </dgm:pt>
     <dgm:pt modelId="{CFAE93D6-7921-4DDC-A23A-AC26D1FC199F}" type="pres">
       <dgm:prSet presAssocID="{ED1F5969-663D-42BC-9AB0-3CBD123959F0}" presName="linNode" presStyleCnt="0"/>
@@ -2085,6 +2092,13 @@
         </dgm:presLayoutVars>
       </dgm:prSet>
       <dgm:spPr/>
+      <dgm:t>
+        <a:bodyPr/>
+        <a:lstStyle/>
+        <a:p>
+          <a:endParaRPr lang="en-US"/>
+        </a:p>
+      </dgm:t>
     </dgm:pt>
     <dgm:pt modelId="{A989CAA7-E4F9-4327-A766-52D2896CEFE2}" type="pres">
       <dgm:prSet presAssocID="{6DC7B96A-E318-4FA7-B1E5-7D55384E67E5}" presName="sp" presStyleCnt="0"/>
@@ -2102,6 +2116,13 @@
         </dgm:presLayoutVars>
       </dgm:prSet>
       <dgm:spPr/>
+      <dgm:t>
+        <a:bodyPr/>
+        <a:lstStyle/>
+        <a:p>
+          <a:endParaRPr lang="en-US"/>
+        </a:p>
+      </dgm:t>
     </dgm:pt>
     <dgm:pt modelId="{D24C75C4-4518-450D-88B6-472121D75422}" type="pres">
       <dgm:prSet presAssocID="{A905EE44-52A1-4558-B8AB-83B76B351C56}" presName="sp" presStyleCnt="0"/>
@@ -2119,6 +2140,13 @@
         </dgm:presLayoutVars>
       </dgm:prSet>
       <dgm:spPr/>
+      <dgm:t>
+        <a:bodyPr/>
+        <a:lstStyle/>
+        <a:p>
+          <a:endParaRPr lang="en-US"/>
+        </a:p>
+      </dgm:t>
     </dgm:pt>
     <dgm:pt modelId="{8148B8F6-4555-422E-B245-41FEB4A31618}" type="pres">
       <dgm:prSet presAssocID="{8983733E-15D3-4581-9188-590CF7DFDF38}" presName="sp" presStyleCnt="0"/>
@@ -2136,6 +2164,13 @@
         </dgm:presLayoutVars>
       </dgm:prSet>
       <dgm:spPr/>
+      <dgm:t>
+        <a:bodyPr/>
+        <a:lstStyle/>
+        <a:p>
+          <a:endParaRPr lang="en-US"/>
+        </a:p>
+      </dgm:t>
     </dgm:pt>
     <dgm:pt modelId="{FBD69C21-BA7A-47B4-970F-23C568E8DDBB}" type="pres">
       <dgm:prSet presAssocID="{C7484DD5-6018-4BDC-8D94-31D726F206A8}" presName="sp" presStyleCnt="0"/>
@@ -2153,6 +2188,13 @@
         </dgm:presLayoutVars>
       </dgm:prSet>
       <dgm:spPr/>
+      <dgm:t>
+        <a:bodyPr/>
+        <a:lstStyle/>
+        <a:p>
+          <a:endParaRPr lang="en-US"/>
+        </a:p>
+      </dgm:t>
     </dgm:pt>
     <dgm:pt modelId="{D49D4D53-A0B9-41D8-A98A-B81D0A0BA326}" type="pres">
       <dgm:prSet presAssocID="{F4C93373-8064-4114-AA39-410CFB070DE7}" presName="descendantText" presStyleLbl="alignAccFollowNode1" presStyleIdx="0" presStyleCnt="1" custScaleY="295022">
@@ -2941,6 +2983,13 @@
         </dgm:presLayoutVars>
       </dgm:prSet>
       <dgm:spPr/>
+      <dgm:t>
+        <a:bodyPr/>
+        <a:lstStyle/>
+        <a:p>
+          <a:endParaRPr lang="en-US"/>
+        </a:p>
+      </dgm:t>
     </dgm:pt>
     <dgm:pt modelId="{E4FA2293-8FDB-4303-AC74-4FF7B1862BD1}" type="pres">
       <dgm:prSet presAssocID="{EFE587F7-10FC-47EB-893F-9CF2450C0878}" presName="linNode" presStyleCnt="0"/>
@@ -2954,6 +3003,13 @@
         </dgm:presLayoutVars>
       </dgm:prSet>
       <dgm:spPr/>
+      <dgm:t>
+        <a:bodyPr/>
+        <a:lstStyle/>
+        <a:p>
+          <a:endParaRPr lang="en-US"/>
+        </a:p>
+      </dgm:t>
     </dgm:pt>
     <dgm:pt modelId="{9DD1BE67-738F-4822-9F77-F754FCDE55C5}" type="pres">
       <dgm:prSet presAssocID="{FC2D358F-C2F0-4996-A310-25B60A5C8879}" presName="sp" presStyleCnt="0"/>
@@ -2971,6 +3027,13 @@
         </dgm:presLayoutVars>
       </dgm:prSet>
       <dgm:spPr/>
+      <dgm:t>
+        <a:bodyPr/>
+        <a:lstStyle/>
+        <a:p>
+          <a:endParaRPr lang="en-US"/>
+        </a:p>
+      </dgm:t>
     </dgm:pt>
     <dgm:pt modelId="{E499D2F3-9190-4EA3-8D91-7D128992369A}" type="pres">
       <dgm:prSet presAssocID="{AD338EC0-9D5B-49E4-B474-008185B5F714}" presName="sp" presStyleCnt="0"/>
@@ -2988,6 +3051,13 @@
         </dgm:presLayoutVars>
       </dgm:prSet>
       <dgm:spPr/>
+      <dgm:t>
+        <a:bodyPr/>
+        <a:lstStyle/>
+        <a:p>
+          <a:endParaRPr lang="en-US"/>
+        </a:p>
+      </dgm:t>
     </dgm:pt>
     <dgm:pt modelId="{4980C328-376B-4444-953B-B449558BE948}" type="pres">
       <dgm:prSet presAssocID="{2B4F7021-C775-472E-B4AC-D95B39D1B58A}" presName="sp" presStyleCnt="0"/>
@@ -3005,6 +3075,13 @@
         </dgm:presLayoutVars>
       </dgm:prSet>
       <dgm:spPr/>
+      <dgm:t>
+        <a:bodyPr/>
+        <a:lstStyle/>
+        <a:p>
+          <a:endParaRPr lang="en-US"/>
+        </a:p>
+      </dgm:t>
     </dgm:pt>
     <dgm:pt modelId="{E4B8D8F6-A6F8-4AFD-B808-3D74C570E9B8}" type="pres">
       <dgm:prSet presAssocID="{796C6F3D-85FF-431E-B693-FE5B25F5A01C}" presName="descendantText" presStyleLbl="alignAccFollowNode1" presStyleIdx="0" presStyleCnt="1" custScaleX="143186" custScaleY="525226">
@@ -3037,9 +3114,9 @@
     <dgm:cxn modelId="{566746D8-AFA5-4394-AF5D-D8AE21D17E24}" srcId="{796C6F3D-85FF-431E-B693-FE5B25F5A01C}" destId="{F7A9C7AF-4AF5-46AB-B677-52EC8ED63C0C}" srcOrd="1" destOrd="0" parTransId="{5A228936-5F98-4EF7-9C99-46C3D4EC5C34}" sibTransId="{C6AFB9D6-43A0-4C29-96FB-8365623310C3}"/>
     <dgm:cxn modelId="{E368D4CD-CCC4-428A-9EBD-1B8614745BAE}" type="presOf" srcId="{38AC03CB-9735-462A-B4C0-48C990F179B0}" destId="{E4B8D8F6-A6F8-4AFD-B808-3D74C570E9B8}" srcOrd="0" destOrd="5" presId="urn:microsoft.com/office/officeart/2005/8/layout/vList5"/>
     <dgm:cxn modelId="{E4FE45C0-91EB-4D31-8CD3-491404EF2A6F}" srcId="{38AC03CB-9735-462A-B4C0-48C990F179B0}" destId="{9E4D539F-E41A-4B09-8D9D-80128CDC35C5}" srcOrd="1" destOrd="0" parTransId="{125E81EA-3EF3-4A2E-A9D8-972EC0942588}" sibTransId="{2D5ECCA8-4CDB-4F94-92F5-E9097CD6D436}"/>
-    <dgm:cxn modelId="{5EAE88B1-7FA6-42CD-8EE7-8B887FFA862A}" type="presOf" srcId="{907B7CD8-847D-4067-9A07-05D79B56BF4F}" destId="{E4B8D8F6-A6F8-4AFD-B808-3D74C570E9B8}" srcOrd="0" destOrd="2" presId="urn:microsoft.com/office/officeart/2005/8/layout/vList5"/>
     <dgm:cxn modelId="{B40FECC4-45B2-4F90-80E0-46170A5A0C4B}" type="presOf" srcId="{B4D8C2EB-657B-4873-9225-3535DE7B6DB6}" destId="{7C44955F-EB0C-40F9-8B38-3CE1DDD7EAEC}" srcOrd="0" destOrd="0" presId="urn:microsoft.com/office/officeart/2005/8/layout/vList5"/>
     <dgm:cxn modelId="{25886237-2BD9-4E11-910F-A29AFE8A0E91}" type="presOf" srcId="{CDD015F5-8B00-4200-82C8-8AA33BEB5D6E}" destId="{E4B8D8F6-A6F8-4AFD-B808-3D74C570E9B8}" srcOrd="0" destOrd="9" presId="urn:microsoft.com/office/officeart/2005/8/layout/vList5"/>
+    <dgm:cxn modelId="{5EAE88B1-7FA6-42CD-8EE7-8B887FFA862A}" type="presOf" srcId="{907B7CD8-847D-4067-9A07-05D79B56BF4F}" destId="{E4B8D8F6-A6F8-4AFD-B808-3D74C570E9B8}" srcOrd="0" destOrd="2" presId="urn:microsoft.com/office/officeart/2005/8/layout/vList5"/>
     <dgm:cxn modelId="{4E4675AB-19D5-47A2-A427-79F8CE8A5517}" srcId="{796C6F3D-85FF-431E-B693-FE5B25F5A01C}" destId="{068BD4E6-C4B3-4BB7-9AB0-17BB6A2761CE}" srcOrd="5" destOrd="0" parTransId="{3265876E-BEAA-48AC-A7A0-876D7D71E0E6}" sibTransId="{72C14AD5-BD16-4B83-927C-E65B023BF452}"/>
     <dgm:cxn modelId="{60957B63-4286-4381-B972-F3440D969AEC}" type="presOf" srcId="{ED6D938F-4FD7-4F03-B534-CED55803F63F}" destId="{E4B8D8F6-A6F8-4AFD-B808-3D74C570E9B8}" srcOrd="0" destOrd="8" presId="urn:microsoft.com/office/officeart/2005/8/layout/vList5"/>
     <dgm:cxn modelId="{F3136043-88E3-4397-8AC5-618A8ABACC5B}" srcId="{F7A9C7AF-4AF5-46AB-B677-52EC8ED63C0C}" destId="{907B7CD8-847D-4067-9A07-05D79B56BF4F}" srcOrd="0" destOrd="0" parTransId="{51244509-CC85-40AD-8D18-2F25FF932E63}" sibTransId="{AD4D2327-773A-4137-9C11-F517B4460624}"/>
@@ -11845,7 +11922,7 @@
         </p:spPr>
         <p:txBody>
           <a:bodyPr>
-            <a:normAutofit fontScale="55000" lnSpcReduction="20000"/>
+            <a:normAutofit/>
           </a:bodyPr>
           <a:lstStyle/>
           <a:p>
@@ -11855,13 +11932,14 @@
               </a:lnSpc>
             </a:pPr>
             <a:r>
-              <a:rPr lang="en-US" sz="2500" dirty="0" smtClean="0"/>
+              <a:rPr lang="en-US" dirty="0" smtClean="0"/>
               <a:t>Professor:				</a:t>
             </a:r>
             <a:r>
-              <a:rPr lang="en-US" sz="2500" dirty="0"/>
-              <a:t>Students:</a:t>
-            </a:r>
+              <a:rPr lang="en-US" dirty="0" smtClean="0"/>
+              <a:t>Student:</a:t>
+            </a:r>
+            <a:endParaRPr lang="en-US" dirty="0"/>
           </a:p>
           <a:p>
             <a:pPr>
@@ -11870,34 +11948,30 @@
               </a:lnSpc>
             </a:pPr>
             <a:r>
-              <a:rPr lang="en-US" sz="2500" dirty="0" smtClean="0"/>
+              <a:rPr lang="en-US" dirty="0" smtClean="0"/>
               <a:t>Dr. </a:t>
             </a:r>
             <a:r>
-              <a:rPr lang="en-US" sz="2500" dirty="0" err="1" smtClean="0"/>
+              <a:rPr lang="en-US" dirty="0" err="1" smtClean="0"/>
               <a:t>Buraga</a:t>
             </a:r>
             <a:r>
-              <a:rPr lang="en-US" sz="2500" dirty="0" smtClean="0"/>
-              <a:t> Sabin				</a:t>
-            </a:r>
-            <a:r>
-              <a:rPr lang="en-US" sz="2500" dirty="0" err="1" smtClean="0"/>
-              <a:t>Butnariu</a:t>
-            </a:r>
-            <a:r>
-              <a:rPr lang="en-US" sz="2500" dirty="0" smtClean="0"/>
-              <a:t> </a:t>
-            </a:r>
-            <a:r>
-              <a:rPr lang="en-US" sz="2500" dirty="0"/>
-              <a:t>V. </a:t>
-            </a:r>
-            <a:r>
-              <a:rPr lang="en-US" sz="2500" dirty="0" err="1"/>
-              <a:t>Vasile-Raducu</a:t>
-            </a:r>
-            <a:endParaRPr lang="en-US" sz="2500" dirty="0"/>
+              <a:rPr lang="en-US" dirty="0" smtClean="0"/>
+              <a:t> Sabin			</a:t>
+            </a:r>
+            <a:r>
+              <a:rPr lang="en-US" dirty="0" err="1" smtClean="0"/>
+              <a:t>Deaconu</a:t>
+            </a:r>
+            <a:r>
+              <a:rPr lang="en-US" dirty="0" smtClean="0"/>
+              <a:t> C. </a:t>
+            </a:r>
+            <a:r>
+              <a:rPr lang="en-US" dirty="0" err="1" smtClean="0"/>
+              <a:t>Mihai</a:t>
+            </a:r>
+            <a:endParaRPr lang="en-US" dirty="0" smtClean="0"/>
           </a:p>
           <a:p>
             <a:pPr>
@@ -11912,58 +11986,6 @@
             <a:r>
               <a:rPr lang="en-US" sz="2500" dirty="0" smtClean="0"/>
               <a:t>				</a:t>
-            </a:r>
-            <a:r>
-              <a:rPr lang="en-US" sz="2500" dirty="0" err="1" smtClean="0"/>
-              <a:t>Deaconu</a:t>
-            </a:r>
-            <a:r>
-              <a:rPr lang="en-US" sz="2500" dirty="0" smtClean="0"/>
-              <a:t> </a:t>
-            </a:r>
-            <a:r>
-              <a:rPr lang="en-US" sz="2500" dirty="0"/>
-              <a:t>C. </a:t>
-            </a:r>
-            <a:r>
-              <a:rPr lang="en-US" sz="2500" dirty="0" err="1"/>
-              <a:t>Mihai</a:t>
-            </a:r>
-            <a:endParaRPr lang="en-US" sz="2500" dirty="0"/>
-          </a:p>
-          <a:p>
-            <a:pPr>
-              <a:lnSpc>
-                <a:spcPct val="90000"/>
-              </a:lnSpc>
-            </a:pPr>
-            <a:r>
-              <a:rPr lang="en-US" sz="2500" dirty="0"/>
-              <a:t>	</a:t>
-            </a:r>
-            <a:r>
-              <a:rPr lang="en-US" sz="2500" dirty="0" smtClean="0"/>
-              <a:t>				</a:t>
-            </a:r>
-            <a:r>
-              <a:rPr lang="en-US" sz="2500" dirty="0" err="1" smtClean="0"/>
-              <a:t>Sfirnaciuc</a:t>
-            </a:r>
-            <a:r>
-              <a:rPr lang="en-US" sz="2500" dirty="0" smtClean="0"/>
-              <a:t> </a:t>
-            </a:r>
-            <a:r>
-              <a:rPr lang="en-US" sz="2500" dirty="0"/>
-              <a:t>D. Daniel-</a:t>
-            </a:r>
-            <a:r>
-              <a:rPr lang="en-US" sz="2500" dirty="0" err="1" smtClean="0"/>
-              <a:t>Ionut</a:t>
-            </a:r>
-            <a:r>
-              <a:rPr lang="en-US" sz="2000" dirty="0" smtClean="0"/>
-              <a:t>		</a:t>
             </a:r>
             <a:endParaRPr lang="en-US" sz="2000" dirty="0"/>
           </a:p>
@@ -13152,21 +13174,7 @@
                 <a:latin typeface="Segoe UI" panose="020B0502040204020203" pitchFamily="34" charset="0"/>
                 <a:cs typeface="Segoe UI" panose="020B0502040204020203" pitchFamily="34" charset="0"/>
               </a:rPr>
-              <a:t>Save option (save as CSV or/and </a:t>
-            </a:r>
-            <a:r>
-              <a:rPr lang="en-US" sz="1800" dirty="0" smtClean="0">
-                <a:latin typeface="Segoe UI" panose="020B0502040204020203" pitchFamily="34" charset="0"/>
-                <a:cs typeface="Segoe UI" panose="020B0502040204020203" pitchFamily="34" charset="0"/>
-              </a:rPr>
-              <a:t>N-triples</a:t>
-            </a:r>
-            <a:r>
-              <a:rPr lang="en-US" sz="1800" dirty="0" smtClean="0">
-                <a:latin typeface="Segoe UI" panose="020B0502040204020203" pitchFamily="34" charset="0"/>
-                <a:cs typeface="Segoe UI" panose="020B0502040204020203" pitchFamily="34" charset="0"/>
-              </a:rPr>
-              <a:t>)</a:t>
+              <a:t>Save option (save as CSV or/and N-triples)</a:t>
             </a:r>
             <a:endParaRPr lang="en-US" sz="1800" dirty="0">
               <a:latin typeface="Segoe UI" panose="020B0502040204020203" pitchFamily="34" charset="0"/>
@@ -14055,18 +14063,18 @@
               <a:buNone/>
             </a:pPr>
             <a:r>
-              <a:rPr lang="en-US" sz="1800" dirty="0" smtClean="0">
+              <a:rPr lang="en-US" sz="1800" smtClean="0">
                 <a:latin typeface="Segoe UI" panose="020B0502040204020203" pitchFamily="34" charset="0"/>
                 <a:cs typeface="Segoe UI" panose="020B0502040204020203" pitchFamily="34" charset="0"/>
               </a:rPr>
               <a:t>-</a:t>
             </a:r>
             <a:r>
-              <a:rPr lang="en-US" sz="1800" dirty="0" err="1" smtClean="0">
+              <a:rPr lang="en-US" sz="1800" smtClean="0">
                 <a:latin typeface="Segoe UI" panose="020B0502040204020203" pitchFamily="34" charset="0"/>
                 <a:cs typeface="Segoe UI" panose="020B0502040204020203" pitchFamily="34" charset="0"/>
               </a:rPr>
-              <a:t>Visualiser</a:t>
+              <a:t>Visualizer</a:t>
             </a:r>
             <a:endParaRPr lang="en-US" sz="1800" dirty="0">
               <a:latin typeface="Segoe UI" panose="020B0502040204020203" pitchFamily="34" charset="0"/>
@@ -14770,14 +14778,7 @@
                 <a:latin typeface="Segoe UI" panose="020B0502040204020203" pitchFamily="34" charset="0"/>
                 <a:cs typeface="Segoe UI" panose="020B0502040204020203" pitchFamily="34" charset="0"/>
               </a:rPr>
-              <a:t>-shiv </a:t>
-            </a:r>
-            <a:r>
-              <a:rPr lang="en-US" sz="1800" dirty="0" smtClean="0">
-                <a:latin typeface="Segoe UI" panose="020B0502040204020203" pitchFamily="34" charset="0"/>
-                <a:cs typeface="Segoe UI" panose="020B0502040204020203" pitchFamily="34" charset="0"/>
-              </a:rPr>
-              <a:t>-</a:t>
+              <a:t>-shiv -</a:t>
             </a:r>
             <a:r>
               <a:rPr lang="en-US" sz="1800" dirty="0">

</xml_diff>